<commit_message>
edited basic slides with key points
</commit_message>
<xml_diff>
--- a/1. Research Paper Implementation_.pptx
+++ b/1. Research Paper Implementation_.pptx
@@ -5,10 +5,10 @@
     <p:sldMasterId id="2147483660" r:id="rId1"/>
   </p:sldMasterIdLst>
   <p:notesMasterIdLst>
-    <p:notesMasterId r:id="rId7"/>
+    <p:notesMasterId r:id="rId8"/>
   </p:notesMasterIdLst>
   <p:handoutMasterIdLst>
-    <p:handoutMasterId r:id="rId8"/>
+    <p:handoutMasterId r:id="rId9"/>
   </p:handoutMasterIdLst>
   <p:sldIdLst>
     <p:sldId id="317" r:id="rId2"/>
@@ -16,20 +16,12 @@
     <p:sldId id="406" r:id="rId4"/>
     <p:sldId id="407" r:id="rId5"/>
     <p:sldId id="405" r:id="rId6"/>
+    <p:sldId id="408" r:id="rId7"/>
   </p:sldIdLst>
   <p:sldSz cx="12195175" cy="6859588"/>
   <p:notesSz cx="7099300" cy="10234613"/>
-  <p:embeddedFontLst>
-    <p:embeddedFont>
-      <p:font typeface="Calibri" panose="020F0502020204030204" pitchFamily="34" charset="0"/>
-      <p:regular r:id="rId9"/>
-      <p:bold r:id="rId10"/>
-      <p:italic r:id="rId11"/>
-      <p:boldItalic r:id="rId12"/>
-    </p:embeddedFont>
-  </p:embeddedFontLst>
   <p:custDataLst>
-    <p:tags r:id="rId13"/>
+    <p:tags r:id="rId10"/>
   </p:custDataLst>
   <p:kinsoku lang="ja-JP" invalStChars="、。，．・：；？！゛゜ヽヾゝゞ々ー’”）〕］｝〉》」』】°‰′″℃￠％ぁぃぅぇぉっゃゅょゎァィゥェォッャュョヮヵヶ!%),.:;?]}｡｣､･ｧｨｩｪｫｬｭｮｯｰﾞﾟ" invalEndChars="‘“（〔［｛〈《「『【￥＄$([\{｢￡"/>
   <p:defaultTextStyle>
@@ -1077,6 +1069,85 @@
     <p:extLst>
       <p:ext uri="{BB962C8B-B14F-4D97-AF65-F5344CB8AC3E}">
         <p14:creationId xmlns:p14="http://schemas.microsoft.com/office/powerpoint/2010/main" val="3580465188"/>
+      </p:ext>
+    </p:extLst>
+  </p:cSld>
+  <p:clrMapOvr>
+    <a:masterClrMapping/>
+  </p:clrMapOvr>
+</p:notes>
+</file>
+
+<file path=ppt/notesSlides/notesSlide6.xml><?xml version="1.0" encoding="utf-8"?>
+<p:notes xmlns:a="http://schemas.openxmlformats.org/drawingml/2006/main" xmlns:r="http://schemas.openxmlformats.org/officeDocument/2006/relationships" xmlns:p="http://schemas.openxmlformats.org/presentationml/2006/main">
+  <p:cSld>
+    <p:spTree>
+      <p:nvGrpSpPr>
+        <p:cNvPr id="1" name="">
+          <a:extLst>
+            <a:ext uri="{FF2B5EF4-FFF2-40B4-BE49-F238E27FC236}">
+              <a16:creationId xmlns:a16="http://schemas.microsoft.com/office/drawing/2014/main" id="{87E89F2C-9202-73EB-AECF-D787EAC7009D}"/>
+            </a:ext>
+          </a:extLst>
+        </p:cNvPr>
+        <p:cNvGrpSpPr/>
+        <p:nvPr/>
+      </p:nvGrpSpPr>
+      <p:grpSpPr>
+        <a:xfrm>
+          <a:off x="0" y="0"/>
+          <a:ext cx="0" cy="0"/>
+          <a:chOff x="0" y="0"/>
+          <a:chExt cx="0" cy="0"/>
+        </a:xfrm>
+      </p:grpSpPr>
+      <p:sp>
+        <p:nvSpPr>
+          <p:cNvPr id="2" name="Slide Image Placeholder 1">
+            <a:extLst>
+              <a:ext uri="{FF2B5EF4-FFF2-40B4-BE49-F238E27FC236}">
+                <a16:creationId xmlns:a16="http://schemas.microsoft.com/office/drawing/2014/main" id="{C7B1E97C-4C86-8760-9E87-5240C84012FC}"/>
+              </a:ext>
+            </a:extLst>
+          </p:cNvPr>
+          <p:cNvSpPr>
+            <a:spLocks noGrp="1" noRot="1" noChangeAspect="1"/>
+          </p:cNvSpPr>
+          <p:nvPr>
+            <p:ph type="sldImg"/>
+          </p:nvPr>
+        </p:nvSpPr>
+        <p:spPr/>
+      </p:sp>
+      <p:sp>
+        <p:nvSpPr>
+          <p:cNvPr id="3" name="Notes Placeholder 2">
+            <a:extLst>
+              <a:ext uri="{FF2B5EF4-FFF2-40B4-BE49-F238E27FC236}">
+                <a16:creationId xmlns:a16="http://schemas.microsoft.com/office/drawing/2014/main" id="{BDE2AD36-AF39-5D71-3AE7-549B3A400606}"/>
+              </a:ext>
+            </a:extLst>
+          </p:cNvPr>
+          <p:cNvSpPr>
+            <a:spLocks noGrp="1"/>
+          </p:cNvSpPr>
+          <p:nvPr>
+            <p:ph type="body" idx="1"/>
+          </p:nvPr>
+        </p:nvSpPr>
+        <p:spPr/>
+        <p:txBody>
+          <a:bodyPr/>
+          <a:lstStyle/>
+          <a:p>
+            <a:endParaRPr lang="en-US" dirty="0"/>
+          </a:p>
+        </p:txBody>
+      </p:sp>
+    </p:spTree>
+    <p:extLst>
+      <p:ext uri="{BB962C8B-B14F-4D97-AF65-F5344CB8AC3E}">
+        <p14:creationId xmlns:p14="http://schemas.microsoft.com/office/powerpoint/2010/main" val="4078043618"/>
       </p:ext>
     </p:extLst>
   </p:cSld>
@@ -22504,7 +22575,7 @@
         </p:nvSpPr>
         <p:spPr>
           <a:xfrm>
-            <a:off x="239248" y="2853730"/>
+            <a:off x="236227" y="3285778"/>
             <a:ext cx="11258940" cy="2088231"/>
           </a:xfrm>
         </p:spPr>
@@ -22529,18 +22600,26 @@
             </a:br>
             <a:r>
               <a:rPr lang="en-GB" sz="4400" dirty="0"/>
-              <a:t>&lt;Title of your Work&gt;</a:t>
+              <a:t>Implementation of </a:t>
+            </a:r>
+            <a:r>
+              <a:rPr lang="en-GB" sz="4400" dirty="0" err="1"/>
+              <a:t>Mulitlevel</a:t>
+            </a:r>
+            <a:r>
+              <a:rPr lang="en-GB" sz="4400" dirty="0"/>
+              <a:t> Visualization of Aggregated Geo-Networks</a:t>
             </a:r>
             <a:br>
               <a:rPr lang="en-GB" sz="4400" dirty="0"/>
             </a:br>
             <a:r>
-              <a:rPr lang="en-GB" sz="2800" b="0" dirty="0"/>
-              <a:t>&lt;</a:t>
+              <a:rPr lang="de-DE" sz="2800" b="0" dirty="0"/>
+              <a:t>Topic </a:t>
             </a:r>
             <a:r>
-              <a:rPr lang="en-US" sz="2400" b="0" dirty="0"/>
-              <a:t> Exercise type&gt;</a:t>
+              <a:rPr lang="de-DE" sz="2800" b="0" dirty="0" err="1"/>
+              <a:t>presentation</a:t>
             </a:r>
             <a:endParaRPr lang="de-AT" b="0" dirty="0"/>
           </a:p>
@@ -22558,7 +22637,7 @@
         </p:nvSpPr>
         <p:spPr>
           <a:xfrm>
-            <a:off x="239248" y="4725938"/>
+            <a:off x="236227" y="5135239"/>
             <a:ext cx="11258940" cy="1080121"/>
           </a:xfrm>
         </p:spPr>
@@ -22568,16 +22647,12 @@
           <a:p>
             <a:pPr eaLnBrk="1" hangingPunct="1"/>
             <a:r>
-              <a:rPr lang="en-US" i="1" dirty="0"/>
-              <a:t>&lt;Names / </a:t>
-            </a:r>
-            <a:r>
               <a:rPr lang="en-US" i="1" dirty="0" err="1"/>
-              <a:t>Matrikelnummer</a:t>
+              <a:t>Xxx</a:t>
             </a:r>
             <a:r>
               <a:rPr lang="en-US" i="1" dirty="0"/>
-              <a:t>&gt;</a:t>
+              <a:t> / xxx, Jessica Hieb / 12421440</a:t>
             </a:r>
           </a:p>
         </p:txBody>
@@ -22609,100 +22684,120 @@
           </a:p>
         </p:txBody>
       </p:sp>
-      <p:sp>
-        <p:nvSpPr>
-          <p:cNvPr id="3" name="Rectangle 2"/>
-          <p:cNvSpPr/>
+      <p:pic>
+        <p:nvPicPr>
+          <p:cNvPr id="5" name="Picture 4">
+            <a:extLst>
+              <a:ext uri="{FF2B5EF4-FFF2-40B4-BE49-F238E27FC236}">
+                <a16:creationId xmlns:a16="http://schemas.microsoft.com/office/drawing/2014/main" id="{42BCEEB1-9728-B2A2-5779-F60270029060}"/>
+              </a:ext>
+            </a:extLst>
+          </p:cNvPr>
+          <p:cNvPicPr>
+            <a:picLocks noChangeAspect="1"/>
+          </p:cNvPicPr>
           <p:nvPr/>
-        </p:nvSpPr>
-        <p:spPr bwMode="auto">
+        </p:nvPicPr>
+        <p:blipFill>
+          <a:blip r:embed="rId3"/>
+          <a:stretch>
+            <a:fillRect/>
+          </a:stretch>
+        </p:blipFill>
+        <p:spPr>
           <a:xfrm>
-            <a:off x="696987" y="405458"/>
-            <a:ext cx="10657184" cy="2448272"/>
+            <a:off x="3671208" y="189434"/>
+            <a:ext cx="4388977" cy="2448273"/>
           </a:xfrm>
           <a:prstGeom prst="rect">
             <a:avLst/>
           </a:prstGeom>
-          <a:ln>
-            <a:prstDash val="dash"/>
-            <a:headEnd type="none" w="med" len="med"/>
-            <a:tailEnd type="none" w="med" len="med"/>
-          </a:ln>
         </p:spPr>
-        <p:style>
-          <a:lnRef idx="2">
-            <a:schemeClr val="dk1"/>
-          </a:lnRef>
-          <a:fillRef idx="1">
-            <a:schemeClr val="lt1"/>
-          </a:fillRef>
-          <a:effectRef idx="0">
-            <a:schemeClr val="dk1"/>
-          </a:effectRef>
-          <a:fontRef idx="minor">
-            <a:schemeClr val="dk1"/>
-          </a:fontRef>
-        </p:style>
+      </p:pic>
+      <p:sp>
+        <p:nvSpPr>
+          <p:cNvPr id="8" name="TextBox 7">
+            <a:extLst>
+              <a:ext uri="{FF2B5EF4-FFF2-40B4-BE49-F238E27FC236}">
+                <a16:creationId xmlns:a16="http://schemas.microsoft.com/office/drawing/2014/main" id="{FCA81B49-919E-E1AA-299B-8545792DB225}"/>
+              </a:ext>
+            </a:extLst>
+          </p:cNvPr>
+          <p:cNvSpPr txBox="1"/>
+          <p:nvPr/>
+        </p:nvSpPr>
+        <p:spPr>
+          <a:xfrm>
+            <a:off x="4569668" y="2588103"/>
+            <a:ext cx="2592056" cy="276999"/>
+          </a:xfrm>
+          <a:prstGeom prst="rect">
+            <a:avLst/>
+          </a:prstGeom>
+          <a:noFill/>
+        </p:spPr>
         <p:txBody>
-          <a:bodyPr rot="0" spcFirstLastPara="0" vertOverflow="overflow" horzOverflow="overflow" vert="horz" wrap="square" lIns="91440" tIns="45720" rIns="91440" bIns="45720" numCol="1" spcCol="0" rtlCol="0" fromWordArt="0" anchor="ctr" anchorCtr="0" forceAA="0" compatLnSpc="1">
-            <a:prstTxWarp prst="textNoShape">
-              <a:avLst/>
-            </a:prstTxWarp>
-            <a:noAutofit/>
+          <a:bodyPr wrap="none" rtlCol="0">
+            <a:spAutoFit/>
           </a:bodyPr>
           <a:lstStyle/>
           <a:p>
-            <a:pPr marL="0" marR="0" indent="0" algn="ctr" defTabSz="914400" rtl="0" eaLnBrk="1" fontAlgn="base" latinLnBrk="0" hangingPunct="1">
-              <a:lnSpc>
-                <a:spcPct val="100000"/>
-              </a:lnSpc>
-              <a:spcBef>
-                <a:spcPct val="0"/>
-              </a:spcBef>
-              <a:spcAft>
-                <a:spcPct val="0"/>
-              </a:spcAft>
-              <a:buClrTx/>
-              <a:buSzTx/>
-              <a:buFontTx/>
-              <a:buNone/>
-              <a:tabLst/>
-            </a:pPr>
             <a:r>
-              <a:rPr kumimoji="0" lang="en-US" sz="2400" b="0" i="0" u="none" strike="noStrike" cap="none" normalizeH="0" baseline="0" dirty="0">
-                <a:ln>
-                  <a:noFill/>
-                </a:ln>
-                <a:solidFill>
-                  <a:schemeClr val="tx1"/>
-                </a:solidFill>
-                <a:effectLst/>
-                <a:latin typeface="+mj-lt"/>
+              <a:rPr lang="de-DE" sz="1200" dirty="0">
+                <a:latin typeface="Calibri" panose="020F0502020204030204" pitchFamily="34" charset="0"/>
               </a:rPr>
-              <a:t>Teaser image of your planned</a:t>
+              <a:t>Case </a:t>
             </a:r>
             <a:r>
-              <a:rPr kumimoji="0" lang="en-US" sz="2400" b="0" i="0" u="none" strike="noStrike" cap="none" normalizeH="0" dirty="0">
-                <a:ln>
-                  <a:noFill/>
-                </a:ln>
-                <a:solidFill>
-                  <a:schemeClr val="tx1"/>
-                </a:solidFill>
-                <a:effectLst/>
-                <a:latin typeface="+mj-lt"/>
+              <a:rPr lang="de-DE" sz="1200" dirty="0" err="1">
+                <a:latin typeface="Calibri" panose="020F0502020204030204" pitchFamily="34" charset="0"/>
               </a:rPr>
-              <a:t> work</a:t>
+              <a:t>study</a:t>
             </a:r>
-            <a:endParaRPr kumimoji="0" lang="en-US" sz="2400" b="0" i="0" u="none" strike="noStrike" cap="none" normalizeH="0" baseline="0" dirty="0">
-              <a:ln>
-                <a:noFill/>
-              </a:ln>
-              <a:solidFill>
-                <a:schemeClr val="tx1"/>
-              </a:solidFill>
-              <a:effectLst/>
-              <a:latin typeface="+mj-lt"/>
+            <a:r>
+              <a:rPr lang="de-DE" sz="1200" dirty="0">
+                <a:latin typeface="Calibri" panose="020F0502020204030204" pitchFamily="34" charset="0"/>
+              </a:rPr>
+              <a:t> on </a:t>
+            </a:r>
+            <a:r>
+              <a:rPr lang="de-DE" sz="1200" dirty="0" err="1">
+                <a:latin typeface="Calibri" panose="020F0502020204030204" pitchFamily="34" charset="0"/>
+              </a:rPr>
+              <a:t>JamCas</a:t>
+            </a:r>
+            <a:r>
+              <a:rPr lang="de-DE" sz="1200" dirty="0">
+                <a:latin typeface="Calibri" panose="020F0502020204030204" pitchFamily="34" charset="0"/>
+              </a:rPr>
+              <a:t> </a:t>
+            </a:r>
+            <a:r>
+              <a:rPr lang="de-DE" sz="1200" dirty="0" err="1">
+                <a:latin typeface="Calibri" panose="020F0502020204030204" pitchFamily="34" charset="0"/>
+              </a:rPr>
+              <a:t>dataset</a:t>
+            </a:r>
+            <a:r>
+              <a:rPr lang="de-DE" sz="1200" dirty="0">
+                <a:latin typeface="Calibri" panose="020F0502020204030204" pitchFamily="34" charset="0"/>
+              </a:rPr>
+              <a:t> </a:t>
+            </a:r>
+            <a:r>
+              <a:rPr lang="de-DE" sz="1200" dirty="0" err="1">
+                <a:latin typeface="Calibri" panose="020F0502020204030204" pitchFamily="34" charset="0"/>
+              </a:rPr>
+              <a:t>from</a:t>
+            </a:r>
+            <a:r>
+              <a:rPr lang="de-DE" sz="1200" dirty="0">
+                <a:latin typeface="Calibri" panose="020F0502020204030204" pitchFamily="34" charset="0"/>
+              </a:rPr>
+              <a:t> [1]</a:t>
+            </a:r>
+            <a:endParaRPr lang="en-GB" sz="1200" dirty="0" err="1">
+              <a:latin typeface="Calibri" panose="020F0502020204030204" pitchFamily="34" charset="0"/>
             </a:endParaRPr>
           </a:p>
         </p:txBody>
@@ -22797,9 +22892,30 @@
               <a:defRPr/>
             </a:pPr>
             <a:r>
-              <a:rPr lang="de-AT"/>
-              <a:t>Enter your name here</a:t>
+              <a:rPr lang="de-AT" dirty="0"/>
+              <a:t>Enter </a:t>
             </a:r>
+            <a:r>
+              <a:rPr lang="de-AT" dirty="0" err="1"/>
+              <a:t>your</a:t>
+            </a:r>
+            <a:r>
+              <a:rPr lang="de-AT" dirty="0"/>
+              <a:t> </a:t>
+            </a:r>
+            <a:r>
+              <a:rPr lang="de-AT" dirty="0" err="1"/>
+              <a:t>name</a:t>
+            </a:r>
+            <a:r>
+              <a:rPr lang="de-AT" dirty="0"/>
+              <a:t> </a:t>
+            </a:r>
+            <a:r>
+              <a:rPr lang="de-AT" dirty="0" err="1"/>
+              <a:t>here</a:t>
+            </a:r>
+            <a:endParaRPr lang="de-AT" dirty="0"/>
           </a:p>
           <a:p>
             <a:pPr>
@@ -22905,7 +23021,7 @@
           <a:bodyPr/>
           <a:lstStyle/>
           <a:p>
-            <a:endParaRPr lang="en-US"/>
+            <a:endParaRPr lang="en-US" dirty="0"/>
           </a:p>
         </p:txBody>
       </p:sp>
@@ -23036,7 +23152,48 @@
           <a:bodyPr/>
           <a:lstStyle/>
           <a:p>
-            <a:endParaRPr lang="en-US"/>
+            <a:r>
+              <a:rPr lang="en-US" dirty="0" err="1"/>
+              <a:t>WebGPU</a:t>
+            </a:r>
+            <a:r>
+              <a:rPr lang="en-US" dirty="0"/>
+              <a:t> / D3</a:t>
+            </a:r>
+          </a:p>
+          <a:p>
+            <a:r>
+              <a:rPr lang="en-US" dirty="0"/>
+              <a:t>Focus on Europe and data from 2024</a:t>
+            </a:r>
+          </a:p>
+          <a:p>
+            <a:r>
+              <a:rPr lang="en-US" dirty="0"/>
+              <a:t>Data sources: World Meteorological </a:t>
+            </a:r>
+            <a:r>
+              <a:rPr lang="en-US" dirty="0" err="1"/>
+              <a:t>Organisation</a:t>
+            </a:r>
+            <a:r>
+              <a:rPr lang="en-US" dirty="0"/>
+              <a:t>, </a:t>
+            </a:r>
+            <a:r>
+              <a:rPr lang="en-GB" dirty="0"/>
+              <a:t>Extreme Events in 2024: </a:t>
+            </a:r>
+            <a:r>
+              <a:rPr lang="en-GB" dirty="0">
+                <a:hlinkClick r:id="rId3"/>
+              </a:rPr>
+              <a:t>2024 Extreme Events Dashboard</a:t>
+            </a:r>
+            <a:r>
+              <a:rPr lang="en-GB" dirty="0"/>
+              <a:t>.</a:t>
+            </a:r>
           </a:p>
         </p:txBody>
       </p:sp>
@@ -23171,17 +23328,46 @@
               <a:buNone/>
             </a:pPr>
             <a:r>
-              <a:rPr lang="en-US" dirty="0"/>
-              <a:t>Authors</a:t>
+              <a:rPr lang="en-GB" dirty="0" err="1"/>
+              <a:t>Zikun</a:t>
             </a:r>
+            <a:r>
+              <a:rPr lang="en-GB" dirty="0"/>
+              <a:t> Deng , Shifu Chen, Xiao Xie , </a:t>
+            </a:r>
+            <a:r>
+              <a:rPr lang="en-GB" dirty="0" err="1"/>
+              <a:t>Guodao</a:t>
+            </a:r>
+            <a:r>
+              <a:rPr lang="en-GB" dirty="0"/>
+              <a:t> Sun , </a:t>
+            </a:r>
+            <a:r>
+              <a:rPr lang="en-GB" dirty="0" err="1"/>
+              <a:t>Mingliang</a:t>
+            </a:r>
+            <a:r>
+              <a:rPr lang="en-GB" dirty="0"/>
+              <a:t> Xu , Di Weng , and </a:t>
+            </a:r>
+            <a:r>
+              <a:rPr lang="en-GB" dirty="0" err="1"/>
+              <a:t>Yingcai</a:t>
+            </a:r>
+            <a:r>
+              <a:rPr lang="en-GB" dirty="0"/>
+              <a:t> Wu</a:t>
+            </a:r>
+            <a:endParaRPr lang="en-US" dirty="0"/>
           </a:p>
           <a:p>
             <a:pPr marL="0" indent="0">
               <a:buNone/>
             </a:pPr>
             <a:r>
-              <a:rPr lang="en-US" sz="3600" b="1" dirty="0"/>
-              <a:t>Title</a:t>
+              <a:rPr lang="en-GB" sz="3600" b="1" dirty="0"/>
+              <a:t>Multilevel Visual Analysis of Aggregate Geo-Networks</a:t>
             </a:r>
             <a:endParaRPr lang="en-US" b="1" dirty="0"/>
           </a:p>
@@ -23190,7 +23376,11 @@
               <a:buNone/>
             </a:pPr>
             <a:r>
-              <a:rPr lang="en-US" dirty="0"/>
+              <a:rPr lang="en-US" dirty="0">
+                <a:highlight>
+                  <a:srgbClr val="FFFF00"/>
+                </a:highlight>
+              </a:rPr>
               <a:t>Journal / Proceedings (+ Issue / Volume) </a:t>
             </a:r>
           </a:p>
@@ -23200,8 +23390,14 @@
             </a:pPr>
             <a:r>
               <a:rPr lang="en-US" dirty="0"/>
-              <a:t>Year</a:t>
+              <a:t>2024</a:t>
             </a:r>
+          </a:p>
+          <a:p>
+            <a:pPr marL="0" indent="0">
+              <a:buNone/>
+            </a:pPr>
+            <a:endParaRPr lang="en-US" dirty="0"/>
           </a:p>
           <a:p>
             <a:pPr marL="0" indent="0">
@@ -23275,6 +23471,191 @@
     <p:extLst>
       <p:ext uri="{BB962C8B-B14F-4D97-AF65-F5344CB8AC3E}">
         <p14:creationId xmlns:p14="http://schemas.microsoft.com/office/powerpoint/2010/main" val="3164382249"/>
+      </p:ext>
+    </p:extLst>
+  </p:cSld>
+  <p:clrMapOvr>
+    <a:masterClrMapping/>
+  </p:clrMapOvr>
+</p:sld>
+</file>
+
+<file path=ppt/slides/slide6.xml><?xml version="1.0" encoding="utf-8"?>
+<p:sld xmlns:a="http://schemas.openxmlformats.org/drawingml/2006/main" xmlns:r="http://schemas.openxmlformats.org/officeDocument/2006/relationships" xmlns:p="http://schemas.openxmlformats.org/presentationml/2006/main">
+  <p:cSld>
+    <p:spTree>
+      <p:nvGrpSpPr>
+        <p:cNvPr id="1" name="">
+          <a:extLst>
+            <a:ext uri="{FF2B5EF4-FFF2-40B4-BE49-F238E27FC236}">
+              <a16:creationId xmlns:a16="http://schemas.microsoft.com/office/drawing/2014/main" id="{2680AF67-9648-A761-6A3D-6391EF24E731}"/>
+            </a:ext>
+          </a:extLst>
+        </p:cNvPr>
+        <p:cNvGrpSpPr/>
+        <p:nvPr/>
+      </p:nvGrpSpPr>
+      <p:grpSpPr>
+        <a:xfrm>
+          <a:off x="0" y="0"/>
+          <a:ext cx="0" cy="0"/>
+          <a:chOff x="0" y="0"/>
+          <a:chExt cx="0" cy="0"/>
+        </a:xfrm>
+      </p:grpSpPr>
+      <p:sp>
+        <p:nvSpPr>
+          <p:cNvPr id="2" name="Title 1">
+            <a:extLst>
+              <a:ext uri="{FF2B5EF4-FFF2-40B4-BE49-F238E27FC236}">
+                <a16:creationId xmlns:a16="http://schemas.microsoft.com/office/drawing/2014/main" id="{DFFA0287-97E8-CF8A-3070-A4F5B18DDE40}"/>
+              </a:ext>
+            </a:extLst>
+          </p:cNvPr>
+          <p:cNvSpPr>
+            <a:spLocks noGrp="1"/>
+          </p:cNvSpPr>
+          <p:nvPr>
+            <p:ph type="title"/>
+          </p:nvPr>
+        </p:nvSpPr>
+        <p:spPr/>
+        <p:txBody>
+          <a:bodyPr/>
+          <a:lstStyle/>
+          <a:p>
+            <a:r>
+              <a:rPr lang="en-US" dirty="0"/>
+              <a:t>Sources</a:t>
+            </a:r>
+          </a:p>
+        </p:txBody>
+      </p:sp>
+      <p:sp>
+        <p:nvSpPr>
+          <p:cNvPr id="3" name="Content Placeholder 2">
+            <a:extLst>
+              <a:ext uri="{FF2B5EF4-FFF2-40B4-BE49-F238E27FC236}">
+                <a16:creationId xmlns:a16="http://schemas.microsoft.com/office/drawing/2014/main" id="{A9FCCAFA-5C01-BAD4-413F-E8355F8063F2}"/>
+              </a:ext>
+            </a:extLst>
+          </p:cNvPr>
+          <p:cNvSpPr>
+            <a:spLocks noGrp="1"/>
+          </p:cNvSpPr>
+          <p:nvPr>
+            <p:ph idx="1"/>
+          </p:nvPr>
+        </p:nvSpPr>
+        <p:spPr/>
+        <p:txBody>
+          <a:bodyPr/>
+          <a:lstStyle/>
+          <a:p>
+            <a:r>
+              <a:rPr lang="en-US" dirty="0"/>
+              <a:t>[1] </a:t>
+            </a:r>
+            <a:r>
+              <a:rPr lang="en-GB" dirty="0"/>
+              <a:t>Z. Deng </a:t>
+            </a:r>
+            <a:r>
+              <a:rPr lang="en-GB" i="1" dirty="0"/>
+              <a:t>et al</a:t>
+            </a:r>
+            <a:r>
+              <a:rPr lang="en-GB" dirty="0"/>
+              <a:t>., "Multilevel Visual Analysis of Aggregate Geo-Networks," in </a:t>
+            </a:r>
+            <a:r>
+              <a:rPr lang="en-GB" i="1" dirty="0"/>
+              <a:t>IEEE Transactions on Visualization and Computer Graphics</a:t>
+            </a:r>
+            <a:r>
+              <a:rPr lang="en-GB" dirty="0"/>
+              <a:t>, vol. 30, no. 7, pp. 3135-3150, July 2024.</a:t>
+            </a:r>
+            <a:endParaRPr lang="en-US" dirty="0"/>
+          </a:p>
+        </p:txBody>
+      </p:sp>
+      <p:sp>
+        <p:nvSpPr>
+          <p:cNvPr id="4" name="Footer Placeholder 3">
+            <a:extLst>
+              <a:ext uri="{FF2B5EF4-FFF2-40B4-BE49-F238E27FC236}">
+                <a16:creationId xmlns:a16="http://schemas.microsoft.com/office/drawing/2014/main" id="{16EB53E9-C954-C5B0-9C35-9541E6C63B96}"/>
+              </a:ext>
+            </a:extLst>
+          </p:cNvPr>
+          <p:cNvSpPr>
+            <a:spLocks noGrp="1"/>
+          </p:cNvSpPr>
+          <p:nvPr>
+            <p:ph type="ftr" sz="quarter" idx="10"/>
+          </p:nvPr>
+        </p:nvSpPr>
+        <p:spPr/>
+        <p:txBody>
+          <a:bodyPr/>
+          <a:lstStyle/>
+          <a:p>
+            <a:pPr>
+              <a:defRPr/>
+            </a:pPr>
+            <a:r>
+              <a:rPr lang="de-AT"/>
+              <a:t>Enter your name here</a:t>
+            </a:r>
+          </a:p>
+          <a:p>
+            <a:pPr>
+              <a:defRPr/>
+            </a:pPr>
+            <a:endParaRPr lang="de-AT" dirty="0"/>
+          </a:p>
+        </p:txBody>
+      </p:sp>
+      <p:sp>
+        <p:nvSpPr>
+          <p:cNvPr id="5" name="Slide Number Placeholder 4">
+            <a:extLst>
+              <a:ext uri="{FF2B5EF4-FFF2-40B4-BE49-F238E27FC236}">
+                <a16:creationId xmlns:a16="http://schemas.microsoft.com/office/drawing/2014/main" id="{3E224F39-CEB2-72BD-D700-2A8920BFFB8B}"/>
+              </a:ext>
+            </a:extLst>
+          </p:cNvPr>
+          <p:cNvSpPr>
+            <a:spLocks noGrp="1"/>
+          </p:cNvSpPr>
+          <p:nvPr>
+            <p:ph type="sldNum" sz="quarter" idx="11"/>
+          </p:nvPr>
+        </p:nvSpPr>
+        <p:spPr/>
+        <p:txBody>
+          <a:bodyPr/>
+          <a:lstStyle/>
+          <a:p>
+            <a:pPr>
+              <a:defRPr/>
+            </a:pPr>
+            <a:fld id="{63707275-EA33-4C2C-A96C-B80BEB93EE54}" type="slidenum">
+              <a:rPr lang="de-AT" smtClean="0"/>
+              <a:pPr>
+                <a:defRPr/>
+              </a:pPr>
+              <a:t>6</a:t>
+            </a:fld>
+            <a:endParaRPr lang="de-AT" dirty="0"/>
+          </a:p>
+        </p:txBody>
+      </p:sp>
+    </p:spTree>
+    <p:extLst>
+      <p:ext uri="{BB962C8B-B14F-4D97-AF65-F5344CB8AC3E}">
+        <p14:creationId xmlns:p14="http://schemas.microsoft.com/office/powerpoint/2010/main" val="1730031874"/>
       </p:ext>
     </p:extLst>
   </p:cSld>

</xml_diff>